<commit_message>
modified:   Class 3.pptx 	modified:   Class 4.pptx
</commit_message>
<xml_diff>
--- a/Class 3.pptx
+++ b/Class 3.pptx
@@ -1810,6 +1810,120 @@
         </a:p>
       </dgm:t>
     </dgm:pt>
+    <dgm:pt modelId="{B658C17C-2199-476B-809E-7A413EFEEA33}">
+      <dgm:prSet phldrT="[文字]" custT="1"/>
+      <dgm:spPr/>
+      <dgm:t>
+        <a:bodyPr/>
+        <a:lstStyle/>
+        <a:p>
+          <a:pPr>
+            <a:buNone/>
+          </a:pPr>
+          <a:r>
+            <a:rPr lang="en-US" altLang="zh-TW" sz="2000"/>
+            <a:t>in	</a:t>
+          </a:r>
+          <a:r>
+            <a:rPr lang="zh-TW" altLang="en-US" sz="2000">
+              <a:solidFill>
+                <a:schemeClr val="bg1">
+                  <a:lumMod val="50000"/>
+                </a:schemeClr>
+              </a:solidFill>
+            </a:rPr>
+            <a:t>是否</a:t>
+          </a:r>
+          <a:r>
+            <a:rPr lang="zh-TW" altLang="en-US" sz="2000"/>
+            <a:t>屬於</a:t>
+          </a:r>
+        </a:p>
+      </dgm:t>
+    </dgm:pt>
+    <dgm:pt modelId="{88CBD1E3-D45A-46C8-90FD-7BBBE2380086}" type="parTrans" cxnId="{3F60D8F7-A254-4143-8494-DB0821104579}">
+      <dgm:prSet/>
+      <dgm:spPr/>
+      <dgm:t>
+        <a:bodyPr/>
+        <a:lstStyle/>
+        <a:p>
+          <a:endParaRPr lang="zh-TW" altLang="en-US"/>
+        </a:p>
+      </dgm:t>
+    </dgm:pt>
+    <dgm:pt modelId="{0A9C3773-69C2-449D-846D-0C5DC3DA8BD2}" type="sibTrans" cxnId="{3F60D8F7-A254-4143-8494-DB0821104579}">
+      <dgm:prSet/>
+      <dgm:spPr/>
+      <dgm:t>
+        <a:bodyPr/>
+        <a:lstStyle/>
+        <a:p>
+          <a:endParaRPr lang="zh-TW" altLang="en-US"/>
+        </a:p>
+      </dgm:t>
+    </dgm:pt>
+    <dgm:pt modelId="{B6430E12-5322-4EDC-B0F5-CC120AF1BEDA}">
+      <dgm:prSet phldrT="[文字]" custT="1"/>
+      <dgm:spPr/>
+      <dgm:t>
+        <a:bodyPr/>
+        <a:lstStyle/>
+        <a:p>
+          <a:pPr>
+            <a:buNone/>
+          </a:pPr>
+          <a:r>
+            <a:rPr lang="en-US" altLang="zh-TW" sz="2000"/>
+            <a:t>not</a:t>
+          </a:r>
+          <a:r>
+            <a:rPr lang="en-US" altLang="zh-TW" sz="1100"/>
+            <a:t> </a:t>
+          </a:r>
+          <a:r>
+            <a:rPr lang="en-US" altLang="zh-TW" sz="2000"/>
+            <a:t>in	</a:t>
+          </a:r>
+          <a:r>
+            <a:rPr lang="zh-TW" altLang="en-US" sz="2000">
+              <a:solidFill>
+                <a:schemeClr val="bg1">
+                  <a:lumMod val="50000"/>
+                </a:schemeClr>
+              </a:solidFill>
+            </a:rPr>
+            <a:t>是否</a:t>
+          </a:r>
+          <a:r>
+            <a:rPr lang="zh-TW" altLang="en-US" sz="2000"/>
+            <a:t>不屬於</a:t>
+          </a:r>
+        </a:p>
+      </dgm:t>
+    </dgm:pt>
+    <dgm:pt modelId="{8F53A839-872C-4A8F-B934-C87FCCBF75B3}" type="parTrans" cxnId="{5E00EF45-6D1C-401C-8310-65DE9F028621}">
+      <dgm:prSet/>
+      <dgm:spPr/>
+      <dgm:t>
+        <a:bodyPr/>
+        <a:lstStyle/>
+        <a:p>
+          <a:endParaRPr lang="zh-TW" altLang="en-US"/>
+        </a:p>
+      </dgm:t>
+    </dgm:pt>
+    <dgm:pt modelId="{EEE7E934-3860-4C43-BA24-7213FAB5C05E}" type="sibTrans" cxnId="{5E00EF45-6D1C-401C-8310-65DE9F028621}">
+      <dgm:prSet/>
+      <dgm:spPr/>
+      <dgm:t>
+        <a:bodyPr/>
+        <a:lstStyle/>
+        <a:p>
+          <a:endParaRPr lang="zh-TW" altLang="en-US"/>
+        </a:p>
+      </dgm:t>
+    </dgm:pt>
     <dgm:pt modelId="{EACC58C6-C413-4940-A3BE-9E1642DCF6FD}" type="pres">
       <dgm:prSet presAssocID="{2C138F02-61B4-4BE1-AD9B-3520F2EDDD93}" presName="Name0" presStyleCnt="0">
         <dgm:presLayoutVars>
@@ -1909,6 +2023,7 @@
     <dgm:cxn modelId="{9E22273D-90AB-47ED-A82E-0C47FF57E60C}" srcId="{558901B3-1F9A-46E4-949A-EF00DFAB962D}" destId="{9FC53E5A-0CEA-49AB-B418-E720DA7D9705}" srcOrd="5" destOrd="0" parTransId="{F06E47F0-6B58-4ED8-B02C-D620C4B61247}" sibTransId="{8D6E560B-A2BB-4A77-B017-1C4DE89A40E5}"/>
     <dgm:cxn modelId="{ACA36F3D-C63B-461E-AEAD-7BCD1003243E}" type="presOf" srcId="{72C98FFE-825A-4BAE-8DA9-32AB2B3D1EEB}" destId="{BD831292-1332-48E9-B1F2-5D73CC306BF4}" srcOrd="0" destOrd="0" presId="urn:microsoft.com/office/officeart/2005/8/layout/hList1"/>
     <dgm:cxn modelId="{F42ED461-A620-4FAF-B559-73CFB8A448EC}" type="presOf" srcId="{7C73ABD2-5361-4E79-A09B-09B4B945CFF3}" destId="{601CDA20-70CD-453C-BD05-E610830FC6D2}" srcOrd="0" destOrd="2" presId="urn:microsoft.com/office/officeart/2005/8/layout/hList1"/>
+    <dgm:cxn modelId="{5E00EF45-6D1C-401C-8310-65DE9F028621}" srcId="{16A6F36B-6333-4C1B-A0F5-3F9F7EE14E4C}" destId="{B6430E12-5322-4EDC-B0F5-CC120AF1BEDA}" srcOrd="7" destOrd="0" parTransId="{8F53A839-872C-4A8F-B934-C87FCCBF75B3}" sibTransId="{EEE7E934-3860-4C43-BA24-7213FAB5C05E}"/>
     <dgm:cxn modelId="{48F87768-BBD0-48A3-A4B7-127D58B9F227}" type="presOf" srcId="{93E02222-7093-44BD-B09C-3067D3B9BC2A}" destId="{2A186F65-26BC-4D9B-92E2-B32C0A3C6694}" srcOrd="0" destOrd="6" presId="urn:microsoft.com/office/officeart/2005/8/layout/hList1"/>
     <dgm:cxn modelId="{C3E0726E-2C9E-4276-B621-EDEC88D8EA7A}" srcId="{558901B3-1F9A-46E4-949A-EF00DFAB962D}" destId="{32EC6FE5-AB86-4941-A908-93C0120C795C}" srcOrd="2" destOrd="0" parTransId="{A9D39ABF-7B4E-44F8-AA07-FA0F94BD9034}" sibTransId="{C4A585E0-A7C6-46AE-8C5C-11649D791990}"/>
     <dgm:cxn modelId="{BF591270-C47B-4427-8A1B-DFA03A4705E9}" srcId="{680CB3D7-17A9-46A4-A2EF-37078C5A7C52}" destId="{2818CA50-19C8-4A23-A9FB-5711177802CB}" srcOrd="0" destOrd="0" parTransId="{4BA2477F-DB6E-408D-9478-FE8422F00A63}" sibTransId="{AF608331-D861-4A83-8326-BBA804C658F9}"/>
@@ -1920,6 +2035,7 @@
     <dgm:cxn modelId="{0D9F6181-A89D-4D07-9C7B-0CA053C53397}" srcId="{558901B3-1F9A-46E4-949A-EF00DFAB962D}" destId="{CDA5A09E-2C7B-436C-BE8C-4AF54AA134BE}" srcOrd="4" destOrd="0" parTransId="{70DAB166-C098-42A1-9A8C-C87CC0CEBA3A}" sibTransId="{9B3D4C89-998E-4FBB-9C16-161D0E84F704}"/>
     <dgm:cxn modelId="{6FA7D68D-434A-4759-8863-83BEB6B7D205}" type="presOf" srcId="{2818CA50-19C8-4A23-A9FB-5711177802CB}" destId="{601CDA20-70CD-453C-BD05-E610830FC6D2}" srcOrd="0" destOrd="0" presId="urn:microsoft.com/office/officeart/2005/8/layout/hList1"/>
     <dgm:cxn modelId="{7AEC7A99-3B67-4A1A-AAD8-4D139757C490}" type="presOf" srcId="{E5316B0A-3F16-48A7-91CA-EA7513ABB6E5}" destId="{BD831292-1332-48E9-B1F2-5D73CC306BF4}" srcOrd="0" destOrd="3" presId="urn:microsoft.com/office/officeart/2005/8/layout/hList1"/>
+    <dgm:cxn modelId="{57BC409F-5764-447E-9096-0AB438AFB136}" type="presOf" srcId="{B658C17C-2199-476B-809E-7A413EFEEA33}" destId="{BD831292-1332-48E9-B1F2-5D73CC306BF4}" srcOrd="0" destOrd="6" presId="urn:microsoft.com/office/officeart/2005/8/layout/hList1"/>
     <dgm:cxn modelId="{148D6CA7-FA57-4837-B898-8511C8C05462}" srcId="{16A6F36B-6333-4C1B-A0F5-3F9F7EE14E4C}" destId="{72C98FFE-825A-4BAE-8DA9-32AB2B3D1EEB}" srcOrd="0" destOrd="0" parTransId="{0353938F-8903-4913-862D-B489B8F4CEDB}" sibTransId="{8BFE39FC-0EC1-49AC-9B24-634DDAE68CB9}"/>
     <dgm:cxn modelId="{C52C9EA9-0132-426F-9285-E84D6D903294}" srcId="{16A6F36B-6333-4C1B-A0F5-3F9F7EE14E4C}" destId="{74E8E8BE-703D-4338-927D-2B10CA69C51E}" srcOrd="1" destOrd="0" parTransId="{AE11D357-1075-42A1-A217-3A6EBA38DF99}" sibTransId="{5B697EDD-4BF8-42C0-B367-0F99BD111742}"/>
     <dgm:cxn modelId="{D99A2BB0-4CD9-4D07-A63F-93D6F8DE790A}" type="presOf" srcId="{16A6F36B-6333-4C1B-A0F5-3F9F7EE14E4C}" destId="{3C16E711-0DE1-46E4-8D06-29D1649A2002}" srcOrd="0" destOrd="0" presId="urn:microsoft.com/office/officeart/2005/8/layout/hList1"/>
@@ -1928,6 +2044,7 @@
     <dgm:cxn modelId="{2E9A47C6-0CD3-4D0D-8BE9-46FB1A48FBAF}" type="presOf" srcId="{50C5998E-2AD6-45EB-AF56-5624DCD08DDC}" destId="{2A186F65-26BC-4D9B-92E2-B32C0A3C6694}" srcOrd="0" destOrd="0" presId="urn:microsoft.com/office/officeart/2005/8/layout/hList1"/>
     <dgm:cxn modelId="{340929D5-988C-461B-981D-2789C32D5CE5}" type="presOf" srcId="{74E8E8BE-703D-4338-927D-2B10CA69C51E}" destId="{BD831292-1332-48E9-B1F2-5D73CC306BF4}" srcOrd="0" destOrd="1" presId="urn:microsoft.com/office/officeart/2005/8/layout/hList1"/>
     <dgm:cxn modelId="{976684D5-CF4E-4F89-A7A1-7AB76321F61E}" type="presOf" srcId="{FB3D3BAC-D937-45D1-A666-E1E074719859}" destId="{BD831292-1332-48E9-B1F2-5D73CC306BF4}" srcOrd="0" destOrd="2" presId="urn:microsoft.com/office/officeart/2005/8/layout/hList1"/>
+    <dgm:cxn modelId="{40D80AD9-0693-4371-A070-B592C0093F52}" type="presOf" srcId="{B6430E12-5322-4EDC-B0F5-CC120AF1BEDA}" destId="{BD831292-1332-48E9-B1F2-5D73CC306BF4}" srcOrd="0" destOrd="7" presId="urn:microsoft.com/office/officeart/2005/8/layout/hList1"/>
     <dgm:cxn modelId="{945ECDDC-35AE-4F9C-812A-8C286F2CE184}" type="presOf" srcId="{CDA5A09E-2C7B-436C-BE8C-4AF54AA134BE}" destId="{2A186F65-26BC-4D9B-92E2-B32C0A3C6694}" srcOrd="0" destOrd="4" presId="urn:microsoft.com/office/officeart/2005/8/layout/hList1"/>
     <dgm:cxn modelId="{22ACE5DE-00D5-4FC9-9B14-DE889453EC3A}" srcId="{2C138F02-61B4-4BE1-AD9B-3520F2EDDD93}" destId="{16A6F36B-6333-4C1B-A0F5-3F9F7EE14E4C}" srcOrd="1" destOrd="0" parTransId="{864184BC-5EF4-4547-901F-182019F72BC2}" sibTransId="{84CBFFB3-5495-4B3A-B522-A5BEF9F16C87}"/>
     <dgm:cxn modelId="{60698DE0-CE76-4E3B-BBEF-DA9965BD8742}" srcId="{16A6F36B-6333-4C1B-A0F5-3F9F7EE14E4C}" destId="{FB3D3BAC-D937-45D1-A666-E1E074719859}" srcOrd="2" destOrd="0" parTransId="{D415C112-BD38-49DB-8468-802AD68B70F5}" sibTransId="{0EB98A8B-2E99-4CEC-8F1B-75D57907388C}"/>
@@ -1935,6 +2052,7 @@
     <dgm:cxn modelId="{705355ED-227A-496D-BB08-E5977E55BE75}" srcId="{558901B3-1F9A-46E4-949A-EF00DFAB962D}" destId="{A318881F-EBBB-4175-86D5-B92D73974608}" srcOrd="1" destOrd="0" parTransId="{8E3B1566-94FC-4E1D-8C3A-B5925B4335DB}" sibTransId="{844FAD3A-3367-4FA5-87DD-FBFF45DF7470}"/>
     <dgm:cxn modelId="{ED420AF0-7F63-4FF1-8287-7E8B8484F024}" srcId="{2C138F02-61B4-4BE1-AD9B-3520F2EDDD93}" destId="{558901B3-1F9A-46E4-949A-EF00DFAB962D}" srcOrd="0" destOrd="0" parTransId="{43FFDE79-0196-43B9-8DCC-A0EE2E87DC5E}" sibTransId="{18B11917-FDAD-4588-BB6F-40CB45C2557F}"/>
     <dgm:cxn modelId="{60911CF3-1F40-42E8-A7F6-244CCDEA978D}" type="presOf" srcId="{D391EC51-A50B-4BF0-9E81-C4C20735D9F7}" destId="{601CDA20-70CD-453C-BD05-E610830FC6D2}" srcOrd="0" destOrd="1" presId="urn:microsoft.com/office/officeart/2005/8/layout/hList1"/>
+    <dgm:cxn modelId="{3F60D8F7-A254-4143-8494-DB0821104579}" srcId="{16A6F36B-6333-4C1B-A0F5-3F9F7EE14E4C}" destId="{B658C17C-2199-476B-809E-7A413EFEEA33}" srcOrd="6" destOrd="0" parTransId="{88CBD1E3-D45A-46C8-90FD-7BBBE2380086}" sibTransId="{0A9C3773-69C2-449D-846D-0C5DC3DA8BD2}"/>
     <dgm:cxn modelId="{50035897-9B9F-45EE-8C20-3521E4E9F6E1}" type="presParOf" srcId="{EACC58C6-C413-4940-A3BE-9E1642DCF6FD}" destId="{C998994B-69CD-498E-BCFB-CEFEBDBB7F95}" srcOrd="0" destOrd="0" presId="urn:microsoft.com/office/officeart/2005/8/layout/hList1"/>
     <dgm:cxn modelId="{83B065AB-A291-411B-850E-DA355B30B69D}" type="presParOf" srcId="{C998994B-69CD-498E-BCFB-CEFEBDBB7F95}" destId="{03CBD516-C389-4C48-812C-846EEB5BDBAF}" srcOrd="0" destOrd="0" presId="urn:microsoft.com/office/officeart/2005/8/layout/hList1"/>
     <dgm:cxn modelId="{48700A72-31A3-41D5-AE32-B81CDFEA6534}" type="presParOf" srcId="{C998994B-69CD-498E-BCFB-CEFEBDBB7F95}" destId="{2A186F65-26BC-4D9B-92E2-B32C0A3C6694}" srcOrd="1" destOrd="0" presId="urn:microsoft.com/office/officeart/2005/8/layout/hList1"/>
@@ -1972,7 +2090,7 @@
       </dsp:nvSpPr>
       <dsp:spPr>
         <a:xfrm>
-          <a:off x="2818" y="404012"/>
+          <a:off x="2818" y="209949"/>
           <a:ext cx="2747936" cy="1099174"/>
         </a:xfrm>
         <a:prstGeom prst="rect">
@@ -2038,7 +2156,7 @@
         </a:p>
       </dsp:txBody>
       <dsp:txXfrm>
-        <a:off x="2818" y="404012"/>
+        <a:off x="2818" y="209949"/>
         <a:ext cx="2747936" cy="1099174"/>
       </dsp:txXfrm>
     </dsp:sp>
@@ -2049,8 +2167,8 @@
       </dsp:nvSpPr>
       <dsp:spPr>
         <a:xfrm>
-          <a:off x="2818" y="1503187"/>
-          <a:ext cx="2747936" cy="2944012"/>
+          <a:off x="2818" y="1309124"/>
+          <a:ext cx="2747936" cy="3332139"/>
         </a:xfrm>
         <a:prstGeom prst="rect">
           <a:avLst/>
@@ -2254,8 +2372,8 @@
         </a:p>
       </dsp:txBody>
       <dsp:txXfrm>
-        <a:off x="2818" y="1503187"/>
-        <a:ext cx="2747936" cy="2944012"/>
+        <a:off x="2818" y="1309124"/>
+        <a:ext cx="2747936" cy="3332139"/>
       </dsp:txXfrm>
     </dsp:sp>
     <dsp:sp modelId="{3C16E711-0DE1-46E4-8D06-29D1649A2002}">
@@ -2265,7 +2383,7 @@
       </dsp:nvSpPr>
       <dsp:spPr>
         <a:xfrm>
-          <a:off x="3135465" y="404012"/>
+          <a:off x="3135465" y="209949"/>
           <a:ext cx="2747936" cy="1099174"/>
         </a:xfrm>
         <a:prstGeom prst="rect">
@@ -2331,7 +2449,7 @@
         </a:p>
       </dsp:txBody>
       <dsp:txXfrm>
-        <a:off x="3135465" y="404012"/>
+        <a:off x="3135465" y="209949"/>
         <a:ext cx="2747936" cy="1099174"/>
       </dsp:txXfrm>
     </dsp:sp>
@@ -2342,8 +2460,8 @@
       </dsp:nvSpPr>
       <dsp:spPr>
         <a:xfrm>
-          <a:off x="3135465" y="1503187"/>
-          <a:ext cx="2747936" cy="2944012"/>
+          <a:off x="3135465" y="1309124"/>
+          <a:ext cx="2747936" cy="3332139"/>
         </a:xfrm>
         <a:prstGeom prst="rect">
           <a:avLst/>
@@ -2582,10 +2700,82 @@
             <a:t>不等於</a:t>
           </a:r>
         </a:p>
+        <a:p>
+          <a:pPr marL="228600" lvl="1" indent="-228600" algn="l" defTabSz="889000">
+            <a:lnSpc>
+              <a:spcPct val="90000"/>
+            </a:lnSpc>
+            <a:spcBef>
+              <a:spcPct val="0"/>
+            </a:spcBef>
+            <a:spcAft>
+              <a:spcPct val="15000"/>
+            </a:spcAft>
+            <a:buNone/>
+          </a:pPr>
+          <a:r>
+            <a:rPr lang="en-US" altLang="zh-TW" sz="2000" kern="1200"/>
+            <a:t>in	</a:t>
+          </a:r>
+          <a:r>
+            <a:rPr lang="zh-TW" altLang="en-US" sz="2000" kern="1200">
+              <a:solidFill>
+                <a:schemeClr val="bg1">
+                  <a:lumMod val="50000"/>
+                </a:schemeClr>
+              </a:solidFill>
+            </a:rPr>
+            <a:t>是否</a:t>
+          </a:r>
+          <a:r>
+            <a:rPr lang="zh-TW" altLang="en-US" sz="2000" kern="1200"/>
+            <a:t>屬於</a:t>
+          </a:r>
+        </a:p>
+        <a:p>
+          <a:pPr marL="228600" lvl="1" indent="-228600" algn="l" defTabSz="889000">
+            <a:lnSpc>
+              <a:spcPct val="90000"/>
+            </a:lnSpc>
+            <a:spcBef>
+              <a:spcPct val="0"/>
+            </a:spcBef>
+            <a:spcAft>
+              <a:spcPct val="15000"/>
+            </a:spcAft>
+            <a:buNone/>
+          </a:pPr>
+          <a:r>
+            <a:rPr lang="en-US" altLang="zh-TW" sz="2000" kern="1200"/>
+            <a:t>not</a:t>
+          </a:r>
+          <a:r>
+            <a:rPr lang="en-US" altLang="zh-TW" sz="1100" kern="1200"/>
+            <a:t> </a:t>
+          </a:r>
+          <a:r>
+            <a:rPr lang="en-US" altLang="zh-TW" sz="2000" kern="1200"/>
+            <a:t>in	</a:t>
+          </a:r>
+          <a:r>
+            <a:rPr lang="zh-TW" altLang="en-US" sz="2000" kern="1200">
+              <a:solidFill>
+                <a:schemeClr val="bg1">
+                  <a:lumMod val="50000"/>
+                </a:schemeClr>
+              </a:solidFill>
+            </a:rPr>
+            <a:t>是否</a:t>
+          </a:r>
+          <a:r>
+            <a:rPr lang="zh-TW" altLang="en-US" sz="2000" kern="1200"/>
+            <a:t>不屬於</a:t>
+          </a:r>
+        </a:p>
       </dsp:txBody>
       <dsp:txXfrm>
-        <a:off x="3135465" y="1503187"/>
-        <a:ext cx="2747936" cy="2944012"/>
+        <a:off x="3135465" y="1309124"/>
+        <a:ext cx="2747936" cy="3332139"/>
       </dsp:txXfrm>
     </dsp:sp>
     <dsp:sp modelId="{388ACFFA-E61C-46C5-9A99-9BF55D492F64}">
@@ -2595,7 +2785,7 @@
       </dsp:nvSpPr>
       <dsp:spPr>
         <a:xfrm>
-          <a:off x="6268113" y="404012"/>
+          <a:off x="6268113" y="209949"/>
           <a:ext cx="2747936" cy="1099174"/>
         </a:xfrm>
         <a:prstGeom prst="rect">
@@ -2661,7 +2851,7 @@
         </a:p>
       </dsp:txBody>
       <dsp:txXfrm>
-        <a:off x="6268113" y="404012"/>
+        <a:off x="6268113" y="209949"/>
         <a:ext cx="2747936" cy="1099174"/>
       </dsp:txXfrm>
     </dsp:sp>
@@ -2672,8 +2862,8 @@
       </dsp:nvSpPr>
       <dsp:spPr>
         <a:xfrm>
-          <a:off x="6268113" y="1503187"/>
-          <a:ext cx="2747936" cy="2944012"/>
+          <a:off x="6268113" y="1309124"/>
+          <a:ext cx="2747936" cy="3332139"/>
         </a:xfrm>
         <a:prstGeom prst="rect">
           <a:avLst/>
@@ -2788,8 +2978,8 @@
         </a:p>
       </dsp:txBody>
       <dsp:txXfrm>
-        <a:off x="6268113" y="1503187"/>
-        <a:ext cx="2747936" cy="2944012"/>
+        <a:off x="6268113" y="1309124"/>
+        <a:ext cx="2747936" cy="3332139"/>
       </dsp:txXfrm>
     </dsp:sp>
   </dsp:spTree>
@@ -4129,7 +4319,7 @@
           <a:p>
             <a:fld id="{BF51CC50-1508-4079-93BE-582398950861}" type="datetimeFigureOut">
               <a:rPr lang="zh-TW" altLang="en-US" smtClean="0"/>
-              <a:t>2022/9/28</a:t>
+              <a:t>2022/10/5</a:t>
             </a:fld>
             <a:endParaRPr lang="zh-TW" altLang="en-US"/>
           </a:p>
@@ -4832,7 +5022,7 @@
           <a:p>
             <a:fld id="{57EACAA5-A08A-41DD-94DD-1D4306A1D919}" type="datetimeFigureOut">
               <a:rPr lang="zh-TW" altLang="en-US" smtClean="0"/>
-              <a:t>2022/9/28</a:t>
+              <a:t>2022/10/5</a:t>
             </a:fld>
             <a:endParaRPr lang="zh-TW" altLang="en-US"/>
           </a:p>
@@ -5060,7 +5250,7 @@
           <a:p>
             <a:fld id="{57EACAA5-A08A-41DD-94DD-1D4306A1D919}" type="datetimeFigureOut">
               <a:rPr lang="zh-TW" altLang="en-US" smtClean="0"/>
-              <a:t>2022/9/28</a:t>
+              <a:t>2022/10/5</a:t>
             </a:fld>
             <a:endParaRPr lang="zh-TW" altLang="en-US"/>
           </a:p>
@@ -5240,7 +5430,7 @@
           <a:p>
             <a:fld id="{57EACAA5-A08A-41DD-94DD-1D4306A1D919}" type="datetimeFigureOut">
               <a:rPr lang="zh-TW" altLang="en-US" smtClean="0"/>
-              <a:t>2022/9/28</a:t>
+              <a:t>2022/10/5</a:t>
             </a:fld>
             <a:endParaRPr lang="zh-TW" altLang="en-US"/>
           </a:p>
@@ -5410,7 +5600,7 @@
           <a:p>
             <a:fld id="{57EACAA5-A08A-41DD-94DD-1D4306A1D919}" type="datetimeFigureOut">
               <a:rPr lang="zh-TW" altLang="en-US" smtClean="0"/>
-              <a:t>2022/9/28</a:t>
+              <a:t>2022/10/5</a:t>
             </a:fld>
             <a:endParaRPr lang="zh-TW" altLang="en-US"/>
           </a:p>
@@ -5664,7 +5854,7 @@
           <a:p>
             <a:fld id="{57EACAA5-A08A-41DD-94DD-1D4306A1D919}" type="datetimeFigureOut">
               <a:rPr lang="zh-TW" altLang="en-US" smtClean="0"/>
-              <a:t>2022/9/28</a:t>
+              <a:t>2022/10/5</a:t>
             </a:fld>
             <a:endParaRPr lang="zh-TW" altLang="en-US"/>
           </a:p>
@@ -5990,7 +6180,7 @@
           <a:p>
             <a:fld id="{57EACAA5-A08A-41DD-94DD-1D4306A1D919}" type="datetimeFigureOut">
               <a:rPr lang="zh-TW" altLang="en-US" smtClean="0"/>
-              <a:t>2022/9/28</a:t>
+              <a:t>2022/10/5</a:t>
             </a:fld>
             <a:endParaRPr lang="zh-TW" altLang="en-US"/>
           </a:p>
@@ -6441,7 +6631,7 @@
           <a:p>
             <a:fld id="{57EACAA5-A08A-41DD-94DD-1D4306A1D919}" type="datetimeFigureOut">
               <a:rPr lang="zh-TW" altLang="en-US" smtClean="0"/>
-              <a:t>2022/9/28</a:t>
+              <a:t>2022/10/5</a:t>
             </a:fld>
             <a:endParaRPr lang="zh-TW" altLang="en-US"/>
           </a:p>
@@ -6559,7 +6749,7 @@
           <a:p>
             <a:fld id="{57EACAA5-A08A-41DD-94DD-1D4306A1D919}" type="datetimeFigureOut">
               <a:rPr lang="zh-TW" altLang="en-US" smtClean="0"/>
-              <a:t>2022/9/28</a:t>
+              <a:t>2022/10/5</a:t>
             </a:fld>
             <a:endParaRPr lang="zh-TW" altLang="en-US"/>
           </a:p>
@@ -6654,7 +6844,7 @@
           <a:p>
             <a:fld id="{57EACAA5-A08A-41DD-94DD-1D4306A1D919}" type="datetimeFigureOut">
               <a:rPr lang="zh-TW" altLang="en-US" smtClean="0"/>
-              <a:t>2022/9/28</a:t>
+              <a:t>2022/10/5</a:t>
             </a:fld>
             <a:endParaRPr lang="zh-TW" altLang="en-US"/>
           </a:p>
@@ -6941,7 +7131,7 @@
           <a:p>
             <a:fld id="{57EACAA5-A08A-41DD-94DD-1D4306A1D919}" type="datetimeFigureOut">
               <a:rPr lang="zh-TW" altLang="en-US" smtClean="0"/>
-              <a:t>2022/9/28</a:t>
+              <a:t>2022/10/5</a:t>
             </a:fld>
             <a:endParaRPr lang="zh-TW" altLang="en-US"/>
           </a:p>
@@ -7263,7 +7453,7 @@
           <a:p>
             <a:fld id="{57EACAA5-A08A-41DD-94DD-1D4306A1D919}" type="datetimeFigureOut">
               <a:rPr lang="zh-TW" altLang="en-US" smtClean="0"/>
-              <a:t>2022/9/28</a:t>
+              <a:t>2022/10/5</a:t>
             </a:fld>
             <a:endParaRPr lang="zh-TW" altLang="en-US"/>
           </a:p>
@@ -7517,7 +7707,7 @@
           <a:p>
             <a:fld id="{57EACAA5-A08A-41DD-94DD-1D4306A1D919}" type="datetimeFigureOut">
               <a:rPr lang="zh-TW" altLang="en-US" smtClean="0"/>
-              <a:t>2022/9/28</a:t>
+              <a:t>2022/10/5</a:t>
             </a:fld>
             <a:endParaRPr lang="zh-TW" altLang="en-US"/>
           </a:p>
@@ -12699,7 +12889,7 @@
           <p:nvPr>
             <p:extLst>
               <p:ext uri="{D42A27DB-BD31-4B8C-83A1-F6EECF244321}">
-                <p14:modId xmlns:p14="http://schemas.microsoft.com/office/powerpoint/2010/main" val="992352818"/>
+                <p14:modId xmlns:p14="http://schemas.microsoft.com/office/powerpoint/2010/main" val="1101321837"/>
               </p:ext>
             </p:extLst>
           </p:nvPr>

</xml_diff>